<commit_message>
fix some typo/bugs and add some explanation
</commit_message>
<xml_diff>
--- a/Doc/Verilog_tutorial.pptx
+++ b/Doc/Verilog_tutorial.pptx
@@ -218,7 +218,7 @@
           <a:p>
             <a:fld id="{6FA9436F-E782-4573-BD65-32C9A25CA544}" type="datetimeFigureOut">
               <a:rPr lang="ko-KR" altLang="en-US" smtClean="0"/>
-              <a:t>2019-07-04</a:t>
+              <a:t>2019-07-05</a:t>
             </a:fld>
             <a:endParaRPr lang="ko-KR" altLang="en-US"/>
           </a:p>
@@ -617,7 +617,7 @@
           <a:p>
             <a:fld id="{A31C32A3-6284-48FF-B391-508F5C205DCD}" type="datetimeFigureOut">
               <a:rPr lang="ko-KR" altLang="en-US" smtClean="0"/>
-              <a:t>2019-07-04</a:t>
+              <a:t>2019-07-05</a:t>
             </a:fld>
             <a:endParaRPr lang="ko-KR" altLang="en-US"/>
           </a:p>
@@ -787,7 +787,7 @@
           <a:p>
             <a:fld id="{A31C32A3-6284-48FF-B391-508F5C205DCD}" type="datetimeFigureOut">
               <a:rPr lang="ko-KR" altLang="en-US" smtClean="0"/>
-              <a:t>2019-07-04</a:t>
+              <a:t>2019-07-05</a:t>
             </a:fld>
             <a:endParaRPr lang="ko-KR" altLang="en-US"/>
           </a:p>
@@ -967,7 +967,7 @@
           <a:p>
             <a:fld id="{A31C32A3-6284-48FF-B391-508F5C205DCD}" type="datetimeFigureOut">
               <a:rPr lang="ko-KR" altLang="en-US" smtClean="0"/>
-              <a:t>2019-07-04</a:t>
+              <a:t>2019-07-05</a:t>
             </a:fld>
             <a:endParaRPr lang="ko-KR" altLang="en-US"/>
           </a:p>
@@ -1169,7 +1169,7 @@
           <a:p>
             <a:fld id="{A31C32A3-6284-48FF-B391-508F5C205DCD}" type="datetimeFigureOut">
               <a:rPr lang="ko-KR" altLang="en-US" smtClean="0"/>
-              <a:t>2019-07-04</a:t>
+              <a:t>2019-07-05</a:t>
             </a:fld>
             <a:endParaRPr lang="ko-KR" altLang="en-US"/>
           </a:p>
@@ -1415,7 +1415,7 @@
           <a:p>
             <a:fld id="{A31C32A3-6284-48FF-B391-508F5C205DCD}" type="datetimeFigureOut">
               <a:rPr lang="ko-KR" altLang="en-US" smtClean="0"/>
-              <a:t>2019-07-04</a:t>
+              <a:t>2019-07-05</a:t>
             </a:fld>
             <a:endParaRPr lang="ko-KR" altLang="en-US"/>
           </a:p>
@@ -1647,7 +1647,7 @@
           <a:p>
             <a:fld id="{A31C32A3-6284-48FF-B391-508F5C205DCD}" type="datetimeFigureOut">
               <a:rPr lang="ko-KR" altLang="en-US" smtClean="0"/>
-              <a:t>2019-07-04</a:t>
+              <a:t>2019-07-05</a:t>
             </a:fld>
             <a:endParaRPr lang="ko-KR" altLang="en-US"/>
           </a:p>
@@ -2014,7 +2014,7 @@
           <a:p>
             <a:fld id="{A31C32A3-6284-48FF-B391-508F5C205DCD}" type="datetimeFigureOut">
               <a:rPr lang="ko-KR" altLang="en-US" smtClean="0"/>
-              <a:t>2019-07-04</a:t>
+              <a:t>2019-07-05</a:t>
             </a:fld>
             <a:endParaRPr lang="ko-KR" altLang="en-US"/>
           </a:p>
@@ -2132,7 +2132,7 @@
           <a:p>
             <a:fld id="{A31C32A3-6284-48FF-B391-508F5C205DCD}" type="datetimeFigureOut">
               <a:rPr lang="ko-KR" altLang="en-US" smtClean="0"/>
-              <a:t>2019-07-04</a:t>
+              <a:t>2019-07-05</a:t>
             </a:fld>
             <a:endParaRPr lang="ko-KR" altLang="en-US"/>
           </a:p>
@@ -2227,7 +2227,7 @@
           <a:p>
             <a:fld id="{A31C32A3-6284-48FF-B391-508F5C205DCD}" type="datetimeFigureOut">
               <a:rPr lang="ko-KR" altLang="en-US" smtClean="0"/>
-              <a:t>2019-07-04</a:t>
+              <a:t>2019-07-05</a:t>
             </a:fld>
             <a:endParaRPr lang="ko-KR" altLang="en-US"/>
           </a:p>
@@ -2504,7 +2504,7 @@
           <a:p>
             <a:fld id="{A31C32A3-6284-48FF-B391-508F5C205DCD}" type="datetimeFigureOut">
               <a:rPr lang="ko-KR" altLang="en-US" smtClean="0"/>
-              <a:t>2019-07-04</a:t>
+              <a:t>2019-07-05</a:t>
             </a:fld>
             <a:endParaRPr lang="ko-KR" altLang="en-US"/>
           </a:p>
@@ -2757,7 +2757,7 @@
           <a:p>
             <a:fld id="{A31C32A3-6284-48FF-B391-508F5C205DCD}" type="datetimeFigureOut">
               <a:rPr lang="ko-KR" altLang="en-US" smtClean="0"/>
-              <a:t>2019-07-04</a:t>
+              <a:t>2019-07-05</a:t>
             </a:fld>
             <a:endParaRPr lang="ko-KR" altLang="en-US"/>
           </a:p>
@@ -2970,7 +2970,7 @@
           <a:p>
             <a:fld id="{A31C32A3-6284-48FF-B391-508F5C205DCD}" type="datetimeFigureOut">
               <a:rPr lang="ko-KR" altLang="en-US" smtClean="0"/>
-              <a:t>2019-07-04</a:t>
+              <a:t>2019-07-05</a:t>
             </a:fld>
             <a:endParaRPr lang="ko-KR" altLang="en-US"/>
           </a:p>
@@ -4993,7 +4993,7 @@
       </p:sp>
       <p:grpSp>
         <p:nvGrpSpPr>
-          <p:cNvPr id="65" name="그룹 64"/>
+          <p:cNvPr id="7" name="그룹 6"/>
           <p:cNvGrpSpPr/>
           <p:nvPr/>
         </p:nvGrpSpPr>
@@ -5571,6 +5571,130 @@
             </a:p>
           </p:txBody>
         </p:sp>
+        <p:cxnSp>
+          <p:nvCxnSpPr>
+            <p:cNvPr id="19" name="직선 연결선 18"/>
+            <p:cNvCxnSpPr/>
+            <p:nvPr/>
+          </p:nvCxnSpPr>
+          <p:spPr>
+            <a:xfrm>
+              <a:off x="5666509" y="3829581"/>
+              <a:ext cx="795648" cy="0"/>
+            </a:xfrm>
+            <a:prstGeom prst="line">
+              <a:avLst/>
+            </a:prstGeom>
+            <a:ln w="28575"/>
+          </p:spPr>
+          <p:style>
+            <a:lnRef idx="1">
+              <a:schemeClr val="dk1"/>
+            </a:lnRef>
+            <a:fillRef idx="0">
+              <a:schemeClr val="dk1"/>
+            </a:fillRef>
+            <a:effectRef idx="0">
+              <a:schemeClr val="dk1"/>
+            </a:effectRef>
+            <a:fontRef idx="minor">
+              <a:schemeClr val="tx1"/>
+            </a:fontRef>
+          </p:style>
+        </p:cxnSp>
+        <p:cxnSp>
+          <p:nvCxnSpPr>
+            <p:cNvPr id="21" name="직선 연결선 20"/>
+            <p:cNvCxnSpPr/>
+            <p:nvPr/>
+          </p:nvCxnSpPr>
+          <p:spPr>
+            <a:xfrm>
+              <a:off x="5666509" y="3949259"/>
+              <a:ext cx="795648" cy="0"/>
+            </a:xfrm>
+            <a:prstGeom prst="line">
+              <a:avLst/>
+            </a:prstGeom>
+            <a:ln w="28575"/>
+          </p:spPr>
+          <p:style>
+            <a:lnRef idx="1">
+              <a:schemeClr val="dk1"/>
+            </a:lnRef>
+            <a:fillRef idx="0">
+              <a:schemeClr val="dk1"/>
+            </a:fillRef>
+            <a:effectRef idx="0">
+              <a:schemeClr val="dk1"/>
+            </a:effectRef>
+            <a:fontRef idx="minor">
+              <a:schemeClr val="tx1"/>
+            </a:fontRef>
+          </p:style>
+        </p:cxnSp>
+        <p:cxnSp>
+          <p:nvCxnSpPr>
+            <p:cNvPr id="22" name="직선 연결선 21"/>
+            <p:cNvCxnSpPr/>
+            <p:nvPr/>
+          </p:nvCxnSpPr>
+          <p:spPr>
+            <a:xfrm>
+              <a:off x="5666509" y="4071970"/>
+              <a:ext cx="795648" cy="0"/>
+            </a:xfrm>
+            <a:prstGeom prst="line">
+              <a:avLst/>
+            </a:prstGeom>
+            <a:ln w="28575"/>
+          </p:spPr>
+          <p:style>
+            <a:lnRef idx="1">
+              <a:schemeClr val="dk1"/>
+            </a:lnRef>
+            <a:fillRef idx="0">
+              <a:schemeClr val="dk1"/>
+            </a:fillRef>
+            <a:effectRef idx="0">
+              <a:schemeClr val="dk1"/>
+            </a:effectRef>
+            <a:fontRef idx="minor">
+              <a:schemeClr val="tx1"/>
+            </a:fontRef>
+          </p:style>
+        </p:cxnSp>
+        <p:cxnSp>
+          <p:nvCxnSpPr>
+            <p:cNvPr id="23" name="직선 연결선 22"/>
+            <p:cNvCxnSpPr/>
+            <p:nvPr/>
+          </p:nvCxnSpPr>
+          <p:spPr>
+            <a:xfrm>
+              <a:off x="5666509" y="4206557"/>
+              <a:ext cx="795648" cy="0"/>
+            </a:xfrm>
+            <a:prstGeom prst="line">
+              <a:avLst/>
+            </a:prstGeom>
+            <a:ln w="28575"/>
+          </p:spPr>
+          <p:style>
+            <a:lnRef idx="1">
+              <a:schemeClr val="dk1"/>
+            </a:lnRef>
+            <a:fillRef idx="0">
+              <a:schemeClr val="dk1"/>
+            </a:fillRef>
+            <a:effectRef idx="0">
+              <a:schemeClr val="dk1"/>
+            </a:effectRef>
+            <a:fontRef idx="minor">
+              <a:schemeClr val="tx1"/>
+            </a:fontRef>
+          </p:style>
+        </p:cxnSp>
       </p:grpSp>
     </p:spTree>
     <p:extLst>
@@ -6074,7 +6198,7 @@
       </p:sp>
       <p:pic>
         <p:nvPicPr>
-          <p:cNvPr id="11" name="그림 10"/>
+          <p:cNvPr id="3" name="그림 2"/>
           <p:cNvPicPr>
             <a:picLocks noChangeAspect="1"/>
           </p:cNvPicPr>
@@ -6259,13 +6383,82 @@
           <a:lstStyle/>
           <a:p>
             <a:r>
+              <a:rPr lang="en-US" altLang="ko-KR" dirty="0" smtClean="0"/>
+              <a:t>Sim/</a:t>
+            </a:r>
+            <a:r>
               <a:rPr lang="en-US" altLang="ko-KR" dirty="0" err="1" smtClean="0"/>
-              <a:t>tb_timer_top.v</a:t>
+              <a:t>Sim_timer_top</a:t>
+            </a:r>
+            <a:r>
+              <a:rPr lang="en-US" altLang="ko-KR" dirty="0" smtClean="0"/>
+              <a:t>/</a:t>
+            </a:r>
+            <a:r>
+              <a:rPr lang="en-US" altLang="ko-KR" dirty="0" err="1" smtClean="0"/>
+              <a:t>tb_main.v</a:t>
             </a:r>
             <a:endParaRPr lang="en-US" altLang="ko-KR" dirty="0" smtClean="0"/>
           </a:p>
           <a:p>
-            <a:endParaRPr lang="ko-KR" altLang="en-US"/>
+            <a:endParaRPr lang="en-US" altLang="ko-KR" dirty="0"/>
+          </a:p>
+          <a:p>
+            <a:r>
+              <a:rPr lang="en-US" altLang="ko-KR" dirty="0" smtClean="0"/>
+              <a:t>Questa</a:t>
+            </a:r>
+            <a:r>
+              <a:rPr lang="ko-KR" altLang="en-US" smtClean="0"/>
+              <a:t>에서</a:t>
+            </a:r>
+            <a:endParaRPr lang="en-US" altLang="ko-KR" dirty="0" smtClean="0"/>
+          </a:p>
+          <a:p>
+            <a:pPr lvl="1"/>
+            <a:r>
+              <a:rPr lang="en-US" altLang="ko-KR" dirty="0" smtClean="0"/>
+              <a:t>do do.do</a:t>
+            </a:r>
+          </a:p>
+          <a:p>
+            <a:pPr lvl="1"/>
+            <a:r>
+              <a:rPr lang="en-US" altLang="ko-KR" dirty="0" smtClean="0"/>
+              <a:t>c       // compile</a:t>
+            </a:r>
+          </a:p>
+          <a:p>
+            <a:pPr lvl="1"/>
+            <a:r>
+              <a:rPr lang="en-US" altLang="ko-KR" dirty="0" smtClean="0"/>
+              <a:t>x       // optimize</a:t>
+            </a:r>
+          </a:p>
+          <a:p>
+            <a:pPr lvl="1"/>
+            <a:r>
+              <a:rPr lang="en-US" altLang="ko-KR" dirty="0" smtClean="0"/>
+              <a:t>l       // design loading</a:t>
+            </a:r>
+          </a:p>
+          <a:p>
+            <a:pPr lvl="1"/>
+            <a:r>
+              <a:rPr lang="en-US" altLang="ko-KR" dirty="0" smtClean="0"/>
+              <a:t>a      // waveform loading</a:t>
+            </a:r>
+          </a:p>
+          <a:p>
+            <a:pPr lvl="1"/>
+            <a:r>
+              <a:rPr lang="en-US" altLang="ko-KR" dirty="0" smtClean="0"/>
+              <a:t>run 5 us</a:t>
+            </a:r>
+            <a:endParaRPr lang="en-US" altLang="ko-KR" dirty="0" smtClean="0"/>
+          </a:p>
+          <a:p>
+            <a:endParaRPr lang="ko-KR" altLang="en-US" dirty="0"/>
           </a:p>
         </p:txBody>
       </p:sp>

</xml_diff>